<commit_message>
2014 5 30 9:58
</commit_message>
<xml_diff>
--- a/seminar.pptx
+++ b/seminar.pptx
@@ -114,6 +114,11 @@
       </a:defRPr>
     </a:lvl9pPr>
   </p:defaultTextStyle>
+  <p:extLst>
+    <p:ext uri="{EFAFB233-063F-42B5-8137-9DF3F51BA10A}">
+      <p15:sldGuideLst xmlns:p15="http://schemas.microsoft.com/office/powerpoint/2012/main"/>
+    </p:ext>
+  </p:extLst>
 </p:presentation>
 </file>
 
@@ -248,7 +253,7 @@
           <a:p>
             <a:fld id="{954DFEFE-0260-482A-A8D1-C7E93A691124}" type="datetimeFigureOut">
               <a:rPr lang="zh-CN" altLang="en-US" smtClean="0"/>
-              <a:t>2014/5/22</a:t>
+              <a:t>2014/5/26</a:t>
             </a:fld>
             <a:endParaRPr lang="zh-CN" altLang="en-US"/>
           </a:p>
@@ -418,7 +423,7 @@
           <a:p>
             <a:fld id="{954DFEFE-0260-482A-A8D1-C7E93A691124}" type="datetimeFigureOut">
               <a:rPr lang="zh-CN" altLang="en-US" smtClean="0"/>
-              <a:t>2014/5/22</a:t>
+              <a:t>2014/5/26</a:t>
             </a:fld>
             <a:endParaRPr lang="zh-CN" altLang="en-US"/>
           </a:p>
@@ -598,7 +603,7 @@
           <a:p>
             <a:fld id="{954DFEFE-0260-482A-A8D1-C7E93A691124}" type="datetimeFigureOut">
               <a:rPr lang="zh-CN" altLang="en-US" smtClean="0"/>
-              <a:t>2014/5/22</a:t>
+              <a:t>2014/5/26</a:t>
             </a:fld>
             <a:endParaRPr lang="zh-CN" altLang="en-US"/>
           </a:p>
@@ -768,7 +773,7 @@
           <a:p>
             <a:fld id="{954DFEFE-0260-482A-A8D1-C7E93A691124}" type="datetimeFigureOut">
               <a:rPr lang="zh-CN" altLang="en-US" smtClean="0"/>
-              <a:t>2014/5/22</a:t>
+              <a:t>2014/5/26</a:t>
             </a:fld>
             <a:endParaRPr lang="zh-CN" altLang="en-US"/>
           </a:p>
@@ -1014,7 +1019,7 @@
           <a:p>
             <a:fld id="{954DFEFE-0260-482A-A8D1-C7E93A691124}" type="datetimeFigureOut">
               <a:rPr lang="zh-CN" altLang="en-US" smtClean="0"/>
-              <a:t>2014/5/22</a:t>
+              <a:t>2014/5/26</a:t>
             </a:fld>
             <a:endParaRPr lang="zh-CN" altLang="en-US"/>
           </a:p>
@@ -1246,7 +1251,7 @@
           <a:p>
             <a:fld id="{954DFEFE-0260-482A-A8D1-C7E93A691124}" type="datetimeFigureOut">
               <a:rPr lang="zh-CN" altLang="en-US" smtClean="0"/>
-              <a:t>2014/5/22</a:t>
+              <a:t>2014/5/26</a:t>
             </a:fld>
             <a:endParaRPr lang="zh-CN" altLang="en-US"/>
           </a:p>
@@ -1613,7 +1618,7 @@
           <a:p>
             <a:fld id="{954DFEFE-0260-482A-A8D1-C7E93A691124}" type="datetimeFigureOut">
               <a:rPr lang="zh-CN" altLang="en-US" smtClean="0"/>
-              <a:t>2014/5/22</a:t>
+              <a:t>2014/5/26</a:t>
             </a:fld>
             <a:endParaRPr lang="zh-CN" altLang="en-US"/>
           </a:p>
@@ -1731,7 +1736,7 @@
           <a:p>
             <a:fld id="{954DFEFE-0260-482A-A8D1-C7E93A691124}" type="datetimeFigureOut">
               <a:rPr lang="zh-CN" altLang="en-US" smtClean="0"/>
-              <a:t>2014/5/22</a:t>
+              <a:t>2014/5/26</a:t>
             </a:fld>
             <a:endParaRPr lang="zh-CN" altLang="en-US"/>
           </a:p>
@@ -1826,7 +1831,7 @@
           <a:p>
             <a:fld id="{954DFEFE-0260-482A-A8D1-C7E93A691124}" type="datetimeFigureOut">
               <a:rPr lang="zh-CN" altLang="en-US" smtClean="0"/>
-              <a:t>2014/5/22</a:t>
+              <a:t>2014/5/26</a:t>
             </a:fld>
             <a:endParaRPr lang="zh-CN" altLang="en-US"/>
           </a:p>
@@ -2103,7 +2108,7 @@
           <a:p>
             <a:fld id="{954DFEFE-0260-482A-A8D1-C7E93A691124}" type="datetimeFigureOut">
               <a:rPr lang="zh-CN" altLang="en-US" smtClean="0"/>
-              <a:t>2014/5/22</a:t>
+              <a:t>2014/5/26</a:t>
             </a:fld>
             <a:endParaRPr lang="zh-CN" altLang="en-US"/>
           </a:p>
@@ -2356,7 +2361,7 @@
           <a:p>
             <a:fld id="{954DFEFE-0260-482A-A8D1-C7E93A691124}" type="datetimeFigureOut">
               <a:rPr lang="zh-CN" altLang="en-US" smtClean="0"/>
-              <a:t>2014/5/22</a:t>
+              <a:t>2014/5/26</a:t>
             </a:fld>
             <a:endParaRPr lang="zh-CN" altLang="en-US"/>
           </a:p>
@@ -2569,7 +2574,7 @@
           <a:p>
             <a:fld id="{954DFEFE-0260-482A-A8D1-C7E93A691124}" type="datetimeFigureOut">
               <a:rPr lang="zh-CN" altLang="en-US" smtClean="0"/>
-              <a:t>2014/5/22</a:t>
+              <a:t>2014/5/26</a:t>
             </a:fld>
             <a:endParaRPr lang="zh-CN" altLang="en-US"/>
           </a:p>
@@ -3094,7 +3099,19 @@
           <a:p>
             <a:r>
               <a:rPr lang="en-US" altLang="zh-CN" dirty="0" smtClean="0"/>
-              <a:t>Spark uses an event-driven architecture and can launch tasks in 5ms.</a:t>
+              <a:t>Spark uses an </a:t>
+            </a:r>
+            <a:r>
+              <a:rPr lang="en-US" altLang="zh-CN" dirty="0" smtClean="0">
+                <a:solidFill>
+                  <a:srgbClr val="FF0000"/>
+                </a:solidFill>
+              </a:rPr>
+              <a:t>event-driven</a:t>
+            </a:r>
+            <a:r>
+              <a:rPr lang="en-US" altLang="zh-CN" dirty="0" smtClean="0"/>
+              <a:t> architecture and can launch tasks in 5ms.</a:t>
             </a:r>
           </a:p>
           <a:p>

</xml_diff>